<commit_message>
more small updates - added reset button to bluegreen page
</commit_message>
<xml_diff>
--- a/docs/app-content.pptx
+++ b/docs/app-content.pptx
@@ -9652,25 +9652,6 @@
               <a:cs typeface="Arial"/>
               <a:sym typeface="Arial"/>
             </a:endParaRPr>
-          </a:p>
-        </p:txBody>
-      </p:sp>
-      <p:sp>
-        <p:nvSpPr>
-          <p:cNvPr id="3" name="Text Placeholder 2"/>
-          <p:cNvSpPr>
-            <a:spLocks noGrp="1"/>
-          </p:cNvSpPr>
-          <p:nvPr>
-            <p:ph type="body" sz="quarter" idx="10"/>
-          </p:nvPr>
-        </p:nvSpPr>
-        <p:spPr/>
-        <p:txBody>
-          <a:bodyPr/>
-          <a:lstStyle/>
-          <a:p>
-            <a:endParaRPr lang="en-US"/>
           </a:p>
         </p:txBody>
       </p:sp>
@@ -10100,7 +10081,7 @@
           </a:solidFill>
           <a:ln w="9525" cap="flat" cmpd="sng">
             <a:solidFill>
-              <a:schemeClr val="dk1"/>
+              <a:schemeClr val="accent4"/>
             </a:solidFill>
             <a:prstDash val="solid"/>
             <a:round/>
@@ -14185,7 +14166,7 @@
           <a:noFill/>
           <a:ln w="12700" cap="flat" cmpd="sng">
             <a:solidFill>
-              <a:schemeClr val="dk2"/>
+              <a:schemeClr val="accent4"/>
             </a:solidFill>
             <a:prstDash val="dash"/>
             <a:round/>
@@ -14247,7 +14228,7 @@
           <a:noFill/>
           <a:ln w="19050" cap="flat" cmpd="sng">
             <a:solidFill>
-              <a:schemeClr val="dk2"/>
+              <a:schemeClr val="accent4"/>
             </a:solidFill>
             <a:prstDash val="solid"/>
             <a:round/>
@@ -14275,7 +14256,7 @@
           <a:noFill/>
           <a:ln w="19050" cap="flat" cmpd="sng">
             <a:solidFill>
-              <a:schemeClr val="dk2"/>
+              <a:schemeClr val="accent4"/>
             </a:solidFill>
             <a:prstDash val="solid"/>
             <a:round/>
@@ -14813,6 +14794,9 @@
             <a:avLst/>
           </a:prstGeom>
           <a:noFill/>
+          <a:ln>
+            <a:noFill/>
+          </a:ln>
         </p:spPr>
         <p:txBody>
           <a:bodyPr wrap="none" rtlCol="0">
@@ -14945,6 +14929,13 @@
   <p:transition xmlns:p14="http://schemas.microsoft.com/office/powerpoint/2010/main" spd="slow">
     <p:cut/>
   </p:transition>
+  <p:timing>
+    <p:tnLst>
+      <p:par>
+        <p:cTn xmlns:p14="http://schemas.microsoft.com/office/powerpoint/2010/main" id="1" dur="indefinite" restart="never" nodeType="tmRoot"/>
+      </p:par>
+    </p:tnLst>
+  </p:timing>
 </p:sld>
 </file>
 

</xml_diff>